<commit_message>
Mein Teil des Recaps hinzugefügt
</commit_message>
<xml_diff>
--- a/Recap/Recap.pptx
+++ b/Recap/Recap.pptx
@@ -5,7 +5,7 @@
     <p:sldMasterId id="2147483648" r:id="rId1"/>
   </p:sldMasterIdLst>
   <p:notesMasterIdLst>
-    <p:notesMasterId r:id="rId9"/>
+    <p:notesMasterId r:id="rId11"/>
   </p:notesMasterIdLst>
   <p:sldIdLst>
     <p:sldId id="256" r:id="rId2"/>
@@ -15,6 +15,8 @@
     <p:sldId id="264" r:id="rId6"/>
     <p:sldId id="262" r:id="rId7"/>
     <p:sldId id="263" r:id="rId8"/>
+    <p:sldId id="265" r:id="rId9"/>
+    <p:sldId id="266" r:id="rId10"/>
   </p:sldIdLst>
   <p:sldSz cx="9144000" cy="6858000" type="screen4x3"/>
   <p:notesSz cx="6858000" cy="9144000"/>
@@ -198,6 +200,7 @@
           <a:p>
             <a:fld id="{5999B01E-CF7E-471B-BBE9-77B825F72211}" type="datetimeFigureOut">
               <a:rPr lang="de-CH" smtClean="0"/>
+              <a:pPr/>
               <a:t>14.10.2015</a:t>
             </a:fld>
             <a:endParaRPr lang="de-CH"/>
@@ -357,6 +360,7 @@
           <a:p>
             <a:fld id="{AE0E38BC-9E91-4F39-B9E2-C7AFA83CF676}" type="slidenum">
               <a:rPr lang="de-CH" smtClean="0"/>
+              <a:pPr/>
               <a:t>‹Nr.›</a:t>
             </a:fld>
             <a:endParaRPr lang="de-CH"/>
@@ -366,7 +370,7 @@
     </p:spTree>
     <p:extLst>
       <p:ext uri="{BB962C8B-B14F-4D97-AF65-F5344CB8AC3E}">
-        <p14:creationId xmlns:p14="http://schemas.microsoft.com/office/powerpoint/2010/main" val="2972343617"/>
+        <p14:creationId xmlns="" xmlns:p14="http://schemas.microsoft.com/office/powerpoint/2010/main" val="2972343617"/>
       </p:ext>
     </p:extLst>
   </p:cSld>
@@ -531,6 +535,7 @@
           <a:p>
             <a:fld id="{AE0E38BC-9E91-4F39-B9E2-C7AFA83CF676}" type="slidenum">
               <a:rPr lang="de-CH" smtClean="0"/>
+              <a:pPr/>
               <a:t>4</a:t>
             </a:fld>
             <a:endParaRPr lang="de-CH"/>
@@ -540,7 +545,7 @@
     </p:spTree>
     <p:extLst>
       <p:ext uri="{BB962C8B-B14F-4D97-AF65-F5344CB8AC3E}">
-        <p14:creationId xmlns:p14="http://schemas.microsoft.com/office/powerpoint/2010/main" val="3710736518"/>
+        <p14:creationId xmlns="" xmlns:p14="http://schemas.microsoft.com/office/powerpoint/2010/main" val="3710736518"/>
       </p:ext>
     </p:extLst>
   </p:cSld>
@@ -731,7 +736,8 @@
           <a:p>
             <a:fld id="{C631D19A-32B1-4D30-8FD1-DB8314AC97CE}" type="datetimeFigureOut">
               <a:rPr lang="de-CH" smtClean="0"/>
-              <a:t>13.10.2015</a:t>
+              <a:pPr/>
+              <a:t>14.10.2015</a:t>
             </a:fld>
             <a:endParaRPr lang="de-CH"/>
           </a:p>
@@ -773,6 +779,7 @@
           <a:p>
             <a:fld id="{C8CB759E-648D-4894-9571-C0604BF601B6}" type="slidenum">
               <a:rPr lang="de-CH" smtClean="0"/>
+              <a:pPr/>
               <a:t>‹Nr.›</a:t>
             </a:fld>
             <a:endParaRPr lang="de-CH"/>
@@ -782,7 +789,7 @@
     </p:spTree>
     <p:extLst>
       <p:ext uri="{BB962C8B-B14F-4D97-AF65-F5344CB8AC3E}">
-        <p14:creationId xmlns:p14="http://schemas.microsoft.com/office/powerpoint/2010/main" val="3418122388"/>
+        <p14:creationId xmlns="" xmlns:p14="http://schemas.microsoft.com/office/powerpoint/2010/main" val="3418122388"/>
       </p:ext>
     </p:extLst>
   </p:cSld>
@@ -901,7 +908,8 @@
           <a:p>
             <a:fld id="{C631D19A-32B1-4D30-8FD1-DB8314AC97CE}" type="datetimeFigureOut">
               <a:rPr lang="de-CH" smtClean="0"/>
-              <a:t>13.10.2015</a:t>
+              <a:pPr/>
+              <a:t>14.10.2015</a:t>
             </a:fld>
             <a:endParaRPr lang="de-CH"/>
           </a:p>
@@ -943,6 +951,7 @@
           <a:p>
             <a:fld id="{C8CB759E-648D-4894-9571-C0604BF601B6}" type="slidenum">
               <a:rPr lang="de-CH" smtClean="0"/>
+              <a:pPr/>
               <a:t>‹Nr.›</a:t>
             </a:fld>
             <a:endParaRPr lang="de-CH"/>
@@ -952,7 +961,7 @@
     </p:spTree>
     <p:extLst>
       <p:ext uri="{BB962C8B-B14F-4D97-AF65-F5344CB8AC3E}">
-        <p14:creationId xmlns:p14="http://schemas.microsoft.com/office/powerpoint/2010/main" val="3819629253"/>
+        <p14:creationId xmlns="" xmlns:p14="http://schemas.microsoft.com/office/powerpoint/2010/main" val="3819629253"/>
       </p:ext>
     </p:extLst>
   </p:cSld>
@@ -1081,7 +1090,8 @@
           <a:p>
             <a:fld id="{C631D19A-32B1-4D30-8FD1-DB8314AC97CE}" type="datetimeFigureOut">
               <a:rPr lang="de-CH" smtClean="0"/>
-              <a:t>13.10.2015</a:t>
+              <a:pPr/>
+              <a:t>14.10.2015</a:t>
             </a:fld>
             <a:endParaRPr lang="de-CH"/>
           </a:p>
@@ -1123,6 +1133,7 @@
           <a:p>
             <a:fld id="{C8CB759E-648D-4894-9571-C0604BF601B6}" type="slidenum">
               <a:rPr lang="de-CH" smtClean="0"/>
+              <a:pPr/>
               <a:t>‹Nr.›</a:t>
             </a:fld>
             <a:endParaRPr lang="de-CH"/>
@@ -1132,7 +1143,7 @@
     </p:spTree>
     <p:extLst>
       <p:ext uri="{BB962C8B-B14F-4D97-AF65-F5344CB8AC3E}">
-        <p14:creationId xmlns:p14="http://schemas.microsoft.com/office/powerpoint/2010/main" val="2835094207"/>
+        <p14:creationId xmlns="" xmlns:p14="http://schemas.microsoft.com/office/powerpoint/2010/main" val="2835094207"/>
       </p:ext>
     </p:extLst>
   </p:cSld>
@@ -1251,7 +1262,8 @@
           <a:p>
             <a:fld id="{C631D19A-32B1-4D30-8FD1-DB8314AC97CE}" type="datetimeFigureOut">
               <a:rPr lang="de-CH" smtClean="0"/>
-              <a:t>13.10.2015</a:t>
+              <a:pPr/>
+              <a:t>14.10.2015</a:t>
             </a:fld>
             <a:endParaRPr lang="de-CH"/>
           </a:p>
@@ -1293,6 +1305,7 @@
           <a:p>
             <a:fld id="{C8CB759E-648D-4894-9571-C0604BF601B6}" type="slidenum">
               <a:rPr lang="de-CH" smtClean="0"/>
+              <a:pPr/>
               <a:t>‹Nr.›</a:t>
             </a:fld>
             <a:endParaRPr lang="de-CH"/>
@@ -1302,7 +1315,7 @@
     </p:spTree>
     <p:extLst>
       <p:ext uri="{BB962C8B-B14F-4D97-AF65-F5344CB8AC3E}">
-        <p14:creationId xmlns:p14="http://schemas.microsoft.com/office/powerpoint/2010/main" val="771690159"/>
+        <p14:creationId xmlns="" xmlns:p14="http://schemas.microsoft.com/office/powerpoint/2010/main" val="771690159"/>
       </p:ext>
     </p:extLst>
   </p:cSld>
@@ -1497,7 +1510,8 @@
           <a:p>
             <a:fld id="{C631D19A-32B1-4D30-8FD1-DB8314AC97CE}" type="datetimeFigureOut">
               <a:rPr lang="de-CH" smtClean="0"/>
-              <a:t>13.10.2015</a:t>
+              <a:pPr/>
+              <a:t>14.10.2015</a:t>
             </a:fld>
             <a:endParaRPr lang="de-CH"/>
           </a:p>
@@ -1539,6 +1553,7 @@
           <a:p>
             <a:fld id="{C8CB759E-648D-4894-9571-C0604BF601B6}" type="slidenum">
               <a:rPr lang="de-CH" smtClean="0"/>
+              <a:pPr/>
               <a:t>‹Nr.›</a:t>
             </a:fld>
             <a:endParaRPr lang="de-CH"/>
@@ -1548,7 +1563,7 @@
     </p:spTree>
     <p:extLst>
       <p:ext uri="{BB962C8B-B14F-4D97-AF65-F5344CB8AC3E}">
-        <p14:creationId xmlns:p14="http://schemas.microsoft.com/office/powerpoint/2010/main" val="2076582155"/>
+        <p14:creationId xmlns="" xmlns:p14="http://schemas.microsoft.com/office/powerpoint/2010/main" val="2076582155"/>
       </p:ext>
     </p:extLst>
   </p:cSld>
@@ -1785,7 +1800,8 @@
           <a:p>
             <a:fld id="{C631D19A-32B1-4D30-8FD1-DB8314AC97CE}" type="datetimeFigureOut">
               <a:rPr lang="de-CH" smtClean="0"/>
-              <a:t>13.10.2015</a:t>
+              <a:pPr/>
+              <a:t>14.10.2015</a:t>
             </a:fld>
             <a:endParaRPr lang="de-CH"/>
           </a:p>
@@ -1827,6 +1843,7 @@
           <a:p>
             <a:fld id="{C8CB759E-648D-4894-9571-C0604BF601B6}" type="slidenum">
               <a:rPr lang="de-CH" smtClean="0"/>
+              <a:pPr/>
               <a:t>‹Nr.›</a:t>
             </a:fld>
             <a:endParaRPr lang="de-CH"/>
@@ -1836,7 +1853,7 @@
     </p:spTree>
     <p:extLst>
       <p:ext uri="{BB962C8B-B14F-4D97-AF65-F5344CB8AC3E}">
-        <p14:creationId xmlns:p14="http://schemas.microsoft.com/office/powerpoint/2010/main" val="3446641067"/>
+        <p14:creationId xmlns="" xmlns:p14="http://schemas.microsoft.com/office/powerpoint/2010/main" val="3446641067"/>
       </p:ext>
     </p:extLst>
   </p:cSld>
@@ -2207,7 +2224,8 @@
           <a:p>
             <a:fld id="{C631D19A-32B1-4D30-8FD1-DB8314AC97CE}" type="datetimeFigureOut">
               <a:rPr lang="de-CH" smtClean="0"/>
-              <a:t>13.10.2015</a:t>
+              <a:pPr/>
+              <a:t>14.10.2015</a:t>
             </a:fld>
             <a:endParaRPr lang="de-CH"/>
           </a:p>
@@ -2249,6 +2267,7 @@
           <a:p>
             <a:fld id="{C8CB759E-648D-4894-9571-C0604BF601B6}" type="slidenum">
               <a:rPr lang="de-CH" smtClean="0"/>
+              <a:pPr/>
               <a:t>‹Nr.›</a:t>
             </a:fld>
             <a:endParaRPr lang="de-CH"/>
@@ -2258,7 +2277,7 @@
     </p:spTree>
     <p:extLst>
       <p:ext uri="{BB962C8B-B14F-4D97-AF65-F5344CB8AC3E}">
-        <p14:creationId xmlns:p14="http://schemas.microsoft.com/office/powerpoint/2010/main" val="462116376"/>
+        <p14:creationId xmlns="" xmlns:p14="http://schemas.microsoft.com/office/powerpoint/2010/main" val="462116376"/>
       </p:ext>
     </p:extLst>
   </p:cSld>
@@ -2325,7 +2344,8 @@
           <a:p>
             <a:fld id="{C631D19A-32B1-4D30-8FD1-DB8314AC97CE}" type="datetimeFigureOut">
               <a:rPr lang="de-CH" smtClean="0"/>
-              <a:t>13.10.2015</a:t>
+              <a:pPr/>
+              <a:t>14.10.2015</a:t>
             </a:fld>
             <a:endParaRPr lang="de-CH"/>
           </a:p>
@@ -2367,6 +2387,7 @@
           <a:p>
             <a:fld id="{C8CB759E-648D-4894-9571-C0604BF601B6}" type="slidenum">
               <a:rPr lang="de-CH" smtClean="0"/>
+              <a:pPr/>
               <a:t>‹Nr.›</a:t>
             </a:fld>
             <a:endParaRPr lang="de-CH"/>
@@ -2376,7 +2397,7 @@
     </p:spTree>
     <p:extLst>
       <p:ext uri="{BB962C8B-B14F-4D97-AF65-F5344CB8AC3E}">
-        <p14:creationId xmlns:p14="http://schemas.microsoft.com/office/powerpoint/2010/main" val="1435737667"/>
+        <p14:creationId xmlns="" xmlns:p14="http://schemas.microsoft.com/office/powerpoint/2010/main" val="1435737667"/>
       </p:ext>
     </p:extLst>
   </p:cSld>
@@ -2420,7 +2441,8 @@
           <a:p>
             <a:fld id="{C631D19A-32B1-4D30-8FD1-DB8314AC97CE}" type="datetimeFigureOut">
               <a:rPr lang="de-CH" smtClean="0"/>
-              <a:t>13.10.2015</a:t>
+              <a:pPr/>
+              <a:t>14.10.2015</a:t>
             </a:fld>
             <a:endParaRPr lang="de-CH"/>
           </a:p>
@@ -2462,6 +2484,7 @@
           <a:p>
             <a:fld id="{C8CB759E-648D-4894-9571-C0604BF601B6}" type="slidenum">
               <a:rPr lang="de-CH" smtClean="0"/>
+              <a:pPr/>
               <a:t>‹Nr.›</a:t>
             </a:fld>
             <a:endParaRPr lang="de-CH"/>
@@ -2471,7 +2494,7 @@
     </p:spTree>
     <p:extLst>
       <p:ext uri="{BB962C8B-B14F-4D97-AF65-F5344CB8AC3E}">
-        <p14:creationId xmlns:p14="http://schemas.microsoft.com/office/powerpoint/2010/main" val="1293513797"/>
+        <p14:creationId xmlns="" xmlns:p14="http://schemas.microsoft.com/office/powerpoint/2010/main" val="1293513797"/>
       </p:ext>
     </p:extLst>
   </p:cSld>
@@ -2697,7 +2720,8 @@
           <a:p>
             <a:fld id="{C631D19A-32B1-4D30-8FD1-DB8314AC97CE}" type="datetimeFigureOut">
               <a:rPr lang="de-CH" smtClean="0"/>
-              <a:t>13.10.2015</a:t>
+              <a:pPr/>
+              <a:t>14.10.2015</a:t>
             </a:fld>
             <a:endParaRPr lang="de-CH"/>
           </a:p>
@@ -2739,6 +2763,7 @@
           <a:p>
             <a:fld id="{C8CB759E-648D-4894-9571-C0604BF601B6}" type="slidenum">
               <a:rPr lang="de-CH" smtClean="0"/>
+              <a:pPr/>
               <a:t>‹Nr.›</a:t>
             </a:fld>
             <a:endParaRPr lang="de-CH"/>
@@ -2748,7 +2773,7 @@
     </p:spTree>
     <p:extLst>
       <p:ext uri="{BB962C8B-B14F-4D97-AF65-F5344CB8AC3E}">
-        <p14:creationId xmlns:p14="http://schemas.microsoft.com/office/powerpoint/2010/main" val="1000640820"/>
+        <p14:creationId xmlns="" xmlns:p14="http://schemas.microsoft.com/office/powerpoint/2010/main" val="1000640820"/>
       </p:ext>
     </p:extLst>
   </p:cSld>
@@ -2950,7 +2975,8 @@
           <a:p>
             <a:fld id="{C631D19A-32B1-4D30-8FD1-DB8314AC97CE}" type="datetimeFigureOut">
               <a:rPr lang="de-CH" smtClean="0"/>
-              <a:t>13.10.2015</a:t>
+              <a:pPr/>
+              <a:t>14.10.2015</a:t>
             </a:fld>
             <a:endParaRPr lang="de-CH"/>
           </a:p>
@@ -2992,6 +3018,7 @@
           <a:p>
             <a:fld id="{C8CB759E-648D-4894-9571-C0604BF601B6}" type="slidenum">
               <a:rPr lang="de-CH" smtClean="0"/>
+              <a:pPr/>
               <a:t>‹Nr.›</a:t>
             </a:fld>
             <a:endParaRPr lang="de-CH"/>
@@ -3001,7 +3028,7 @@
     </p:spTree>
     <p:extLst>
       <p:ext uri="{BB962C8B-B14F-4D97-AF65-F5344CB8AC3E}">
-        <p14:creationId xmlns:p14="http://schemas.microsoft.com/office/powerpoint/2010/main" val="1924031751"/>
+        <p14:creationId xmlns="" xmlns:p14="http://schemas.microsoft.com/office/powerpoint/2010/main" val="1924031751"/>
       </p:ext>
     </p:extLst>
   </p:cSld>
@@ -3163,7 +3190,8 @@
           <a:p>
             <a:fld id="{C631D19A-32B1-4D30-8FD1-DB8314AC97CE}" type="datetimeFigureOut">
               <a:rPr lang="de-CH" smtClean="0"/>
-              <a:t>13.10.2015</a:t>
+              <a:pPr/>
+              <a:t>14.10.2015</a:t>
             </a:fld>
             <a:endParaRPr lang="de-CH"/>
           </a:p>
@@ -3241,6 +3269,7 @@
           <a:p>
             <a:fld id="{C8CB759E-648D-4894-9571-C0604BF601B6}" type="slidenum">
               <a:rPr lang="de-CH" smtClean="0"/>
+              <a:pPr/>
               <a:t>‹Nr.›</a:t>
             </a:fld>
             <a:endParaRPr lang="de-CH"/>
@@ -3250,7 +3279,7 @@
     </p:spTree>
     <p:extLst>
       <p:ext uri="{BB962C8B-B14F-4D97-AF65-F5344CB8AC3E}">
-        <p14:creationId xmlns:p14="http://schemas.microsoft.com/office/powerpoint/2010/main" val="4106584478"/>
+        <p14:creationId xmlns="" xmlns:p14="http://schemas.microsoft.com/office/powerpoint/2010/main" val="4106584478"/>
       </p:ext>
     </p:extLst>
   </p:cSld>
@@ -3579,7 +3608,7 @@
     </p:spTree>
     <p:extLst>
       <p:ext uri="{BB962C8B-B14F-4D97-AF65-F5344CB8AC3E}">
-        <p14:creationId xmlns:p14="http://schemas.microsoft.com/office/powerpoint/2010/main" val="2670384790"/>
+        <p14:creationId xmlns="" xmlns:p14="http://schemas.microsoft.com/office/powerpoint/2010/main" val="2670384790"/>
       </p:ext>
     </p:extLst>
   </p:cSld>
@@ -3756,7 +3785,7 @@
     </p:spTree>
     <p:extLst>
       <p:ext uri="{BB962C8B-B14F-4D97-AF65-F5344CB8AC3E}">
-        <p14:creationId xmlns:p14="http://schemas.microsoft.com/office/powerpoint/2010/main" val="435465797"/>
+        <p14:creationId xmlns="" xmlns:p14="http://schemas.microsoft.com/office/powerpoint/2010/main" val="435465797"/>
       </p:ext>
     </p:extLst>
   </p:cSld>
@@ -3764,7 +3793,7 @@
     <a:masterClrMapping/>
   </p:clrMapOvr>
   <mc:AlternateContent xmlns:mc="http://schemas.openxmlformats.org/markup-compatibility/2006">
-    <mc:Choice xmlns:p14="http://schemas.microsoft.com/office/powerpoint/2010/main" Requires="p14">
+    <mc:Choice xmlns="" xmlns:p14="http://schemas.microsoft.com/office/powerpoint/2010/main" Requires="p14">
       <p:transition spd="slow" p14:dur="2000"/>
     </mc:Choice>
     <mc:Fallback>
@@ -3800,10 +3829,10 @@
           <p:nvPr/>
         </p:nvPicPr>
         <p:blipFill>
-          <a:blip r:embed="rId2">
+          <a:blip r:embed="rId2" cstate="print">
             <a:extLst>
               <a:ext uri="{28A0092B-C50C-407E-A947-70E740481C1C}">
-                <a14:useLocalDpi xmlns:a14="http://schemas.microsoft.com/office/drawing/2010/main" val="0"/>
+                <a14:useLocalDpi xmlns="" xmlns:a14="http://schemas.microsoft.com/office/drawing/2010/main" val="0"/>
               </a:ext>
             </a:extLst>
           </a:blip>
@@ -3925,7 +3954,7 @@
     </p:spTree>
     <p:extLst>
       <p:ext uri="{BB962C8B-B14F-4D97-AF65-F5344CB8AC3E}">
-        <p14:creationId xmlns:p14="http://schemas.microsoft.com/office/powerpoint/2010/main" val="4086224160"/>
+        <p14:creationId xmlns="" xmlns:p14="http://schemas.microsoft.com/office/powerpoint/2010/main" val="4086224160"/>
       </p:ext>
     </p:extLst>
   </p:cSld>
@@ -4035,10 +4064,10 @@
           <p:nvPr/>
         </p:nvPicPr>
         <p:blipFill>
-          <a:blip r:embed="rId3">
+          <a:blip r:embed="rId3" cstate="print">
             <a:extLst>
               <a:ext uri="{28A0092B-C50C-407E-A947-70E740481C1C}">
-                <a14:useLocalDpi xmlns:a14="http://schemas.microsoft.com/office/drawing/2010/main" val="0"/>
+                <a14:useLocalDpi xmlns="" xmlns:a14="http://schemas.microsoft.com/office/drawing/2010/main" val="0"/>
               </a:ext>
             </a:extLst>
           </a:blip>
@@ -4086,7 +4115,7 @@
     </p:spTree>
     <p:extLst>
       <p:ext uri="{BB962C8B-B14F-4D97-AF65-F5344CB8AC3E}">
-        <p14:creationId xmlns:p14="http://schemas.microsoft.com/office/powerpoint/2010/main" val="2654074023"/>
+        <p14:creationId xmlns="" xmlns:p14="http://schemas.microsoft.com/office/powerpoint/2010/main" val="2654074023"/>
       </p:ext>
     </p:extLst>
   </p:cSld>
@@ -4250,10 +4279,10 @@
           <p:nvPr/>
         </p:nvPicPr>
         <p:blipFill>
-          <a:blip r:embed="rId2">
+          <a:blip r:embed="rId2" cstate="print">
             <a:extLst>
               <a:ext uri="{28A0092B-C50C-407E-A947-70E740481C1C}">
-                <a14:useLocalDpi xmlns:a14="http://schemas.microsoft.com/office/drawing/2010/main" val="0"/>
+                <a14:useLocalDpi xmlns="" xmlns:a14="http://schemas.microsoft.com/office/drawing/2010/main" val="0"/>
               </a:ext>
             </a:extLst>
           </a:blip>
@@ -4274,7 +4303,7 @@
     </p:spTree>
     <p:extLst>
       <p:ext uri="{BB962C8B-B14F-4D97-AF65-F5344CB8AC3E}">
-        <p14:creationId xmlns:p14="http://schemas.microsoft.com/office/powerpoint/2010/main" val="69236346"/>
+        <p14:creationId xmlns="" xmlns:p14="http://schemas.microsoft.com/office/powerpoint/2010/main" val="69236346"/>
       </p:ext>
     </p:extLst>
   </p:cSld>
@@ -4445,7 +4474,7 @@
     </p:spTree>
     <p:extLst>
       <p:ext uri="{BB962C8B-B14F-4D97-AF65-F5344CB8AC3E}">
-        <p14:creationId xmlns:p14="http://schemas.microsoft.com/office/powerpoint/2010/main" val="447240795"/>
+        <p14:creationId xmlns="" xmlns:p14="http://schemas.microsoft.com/office/powerpoint/2010/main" val="447240795"/>
       </p:ext>
     </p:extLst>
   </p:cSld>
@@ -4562,10 +4591,10 @@
           <p:nvPr/>
         </p:nvPicPr>
         <p:blipFill>
-          <a:blip r:embed="rId2">
+          <a:blip r:embed="rId2" cstate="print">
             <a:extLst>
               <a:ext uri="{28A0092B-C50C-407E-A947-70E740481C1C}">
-                <a14:useLocalDpi xmlns:a14="http://schemas.microsoft.com/office/drawing/2010/main" val="0"/>
+                <a14:useLocalDpi xmlns="" xmlns:a14="http://schemas.microsoft.com/office/drawing/2010/main" val="0"/>
               </a:ext>
             </a:extLst>
           </a:blip>
@@ -4586,7 +4615,7 @@
     </p:spTree>
     <p:extLst>
       <p:ext uri="{BB962C8B-B14F-4D97-AF65-F5344CB8AC3E}">
-        <p14:creationId xmlns:p14="http://schemas.microsoft.com/office/powerpoint/2010/main" val="3311535714"/>
+        <p14:creationId xmlns="" xmlns:p14="http://schemas.microsoft.com/office/powerpoint/2010/main" val="3311535714"/>
       </p:ext>
     </p:extLst>
   </p:cSld>
@@ -4600,6 +4629,191 @@
       </p:par>
     </p:tnLst>
   </p:timing>
+</p:sld>
+</file>
+
+<file path=ppt/slides/slide8.xml><?xml version="1.0" encoding="utf-8"?>
+<p:sld xmlns:a="http://schemas.openxmlformats.org/drawingml/2006/main" xmlns:r="http://schemas.openxmlformats.org/officeDocument/2006/relationships" xmlns:p="http://schemas.openxmlformats.org/presentationml/2006/main">
+  <p:cSld>
+    <p:spTree>
+      <p:nvGrpSpPr>
+        <p:cNvPr id="1" name=""/>
+        <p:cNvGrpSpPr/>
+        <p:nvPr/>
+      </p:nvGrpSpPr>
+      <p:grpSpPr>
+        <a:xfrm>
+          <a:off x="0" y="0"/>
+          <a:ext cx="0" cy="0"/>
+          <a:chOff x="0" y="0"/>
+          <a:chExt cx="0" cy="0"/>
+        </a:xfrm>
+      </p:grpSpPr>
+      <p:sp>
+        <p:nvSpPr>
+          <p:cNvPr id="2" name="Titel 1"/>
+          <p:cNvSpPr>
+            <a:spLocks noGrp="1"/>
+          </p:cNvSpPr>
+          <p:nvPr>
+            <p:ph type="title"/>
+          </p:nvPr>
+        </p:nvSpPr>
+        <p:spPr/>
+        <p:txBody>
+          <a:bodyPr/>
+          <a:lstStyle/>
+          <a:p>
+            <a:r>
+              <a:rPr lang="de-CH" dirty="0" smtClean="0"/>
+              <a:t>The </a:t>
+            </a:r>
+            <a:r>
+              <a:rPr lang="de-CH" dirty="0" err="1" smtClean="0"/>
+              <a:t>principle</a:t>
+            </a:r>
+            <a:endParaRPr lang="de-CH" dirty="0"/>
+          </a:p>
+        </p:txBody>
+      </p:sp>
+      <p:sp>
+        <p:nvSpPr>
+          <p:cNvPr id="3" name="Inhaltsplatzhalter 2"/>
+          <p:cNvSpPr>
+            <a:spLocks noGrp="1"/>
+          </p:cNvSpPr>
+          <p:nvPr>
+            <p:ph idx="1"/>
+          </p:nvPr>
+        </p:nvSpPr>
+        <p:spPr/>
+        <p:txBody>
+          <a:bodyPr/>
+          <a:lstStyle/>
+          <a:p>
+            <a:endParaRPr lang="de-CH"/>
+          </a:p>
+        </p:txBody>
+      </p:sp>
+      <p:pic>
+        <p:nvPicPr>
+          <p:cNvPr id="1026" name="Picture 2"/>
+          <p:cNvPicPr>
+            <a:picLocks noChangeAspect="1" noChangeArrowheads="1"/>
+          </p:cNvPicPr>
+          <p:nvPr/>
+        </p:nvPicPr>
+        <p:blipFill>
+          <a:blip r:embed="rId2" cstate="print"/>
+          <a:srcRect/>
+          <a:stretch>
+            <a:fillRect/>
+          </a:stretch>
+        </p:blipFill>
+        <p:spPr bwMode="auto">
+          <a:xfrm>
+            <a:off x="456399" y="1556792"/>
+            <a:ext cx="8292065" cy="4493823"/>
+          </a:xfrm>
+          <a:prstGeom prst="rect">
+            <a:avLst/>
+          </a:prstGeom>
+          <a:noFill/>
+          <a:ln w="9525">
+            <a:noFill/>
+            <a:miter lim="800000"/>
+            <a:headEnd/>
+            <a:tailEnd/>
+          </a:ln>
+        </p:spPr>
+      </p:pic>
+    </p:spTree>
+  </p:cSld>
+  <p:clrMapOvr>
+    <a:masterClrMapping/>
+  </p:clrMapOvr>
+</p:sld>
+</file>
+
+<file path=ppt/slides/slide9.xml><?xml version="1.0" encoding="utf-8"?>
+<p:sld xmlns:a="http://schemas.openxmlformats.org/drawingml/2006/main" xmlns:r="http://schemas.openxmlformats.org/officeDocument/2006/relationships" xmlns:p="http://schemas.openxmlformats.org/presentationml/2006/main">
+  <p:cSld>
+    <p:spTree>
+      <p:nvGrpSpPr>
+        <p:cNvPr id="1" name=""/>
+        <p:cNvGrpSpPr/>
+        <p:nvPr/>
+      </p:nvGrpSpPr>
+      <p:grpSpPr>
+        <a:xfrm>
+          <a:off x="0" y="0"/>
+          <a:ext cx="0" cy="0"/>
+          <a:chOff x="0" y="0"/>
+          <a:chExt cx="0" cy="0"/>
+        </a:xfrm>
+      </p:grpSpPr>
+      <p:sp>
+        <p:nvSpPr>
+          <p:cNvPr id="2" name="Titel 1"/>
+          <p:cNvSpPr>
+            <a:spLocks noGrp="1"/>
+          </p:cNvSpPr>
+          <p:nvPr>
+            <p:ph type="title"/>
+          </p:nvPr>
+        </p:nvSpPr>
+        <p:spPr/>
+        <p:txBody>
+          <a:bodyPr/>
+          <a:lstStyle/>
+          <a:p>
+            <a:r>
+              <a:rPr lang="de-CH" dirty="0" err="1" smtClean="0"/>
+              <a:t>Application</a:t>
+            </a:r>
+            <a:endParaRPr lang="de-CH" dirty="0"/>
+          </a:p>
+        </p:txBody>
+      </p:sp>
+      <p:pic>
+        <p:nvPicPr>
+          <p:cNvPr id="1026" name="Picture 2"/>
+          <p:cNvPicPr>
+            <a:picLocks noGrp="1" noChangeAspect="1" noChangeArrowheads="1"/>
+          </p:cNvPicPr>
+          <p:nvPr>
+            <p:ph idx="1"/>
+          </p:nvPr>
+        </p:nvPicPr>
+        <p:blipFill>
+          <a:blip r:embed="rId2" cstate="print"/>
+          <a:srcRect/>
+          <a:stretch>
+            <a:fillRect/>
+          </a:stretch>
+        </p:blipFill>
+        <p:spPr bwMode="auto">
+          <a:xfrm>
+            <a:off x="1100137" y="2234406"/>
+            <a:ext cx="6943725" cy="3257550"/>
+          </a:xfrm>
+          <a:prstGeom prst="rect">
+            <a:avLst/>
+          </a:prstGeom>
+          <a:noFill/>
+          <a:ln w="9525">
+            <a:noFill/>
+            <a:miter lim="800000"/>
+            <a:headEnd/>
+            <a:tailEnd/>
+          </a:ln>
+        </p:spPr>
+      </p:pic>
+    </p:spTree>
+  </p:cSld>
+  <p:clrMapOvr>
+    <a:masterClrMapping/>
+  </p:clrMapOvr>
 </p:sld>
 </file>
 

</xml_diff>

<commit_message>
Kleineres Update zu meinen Folien
</commit_message>
<xml_diff>
--- a/Recap/Recap.pptx
+++ b/Recap/Recap.pptx
@@ -5,18 +5,17 @@
     <p:sldMasterId id="2147483648" r:id="rId1"/>
   </p:sldMasterIdLst>
   <p:notesMasterIdLst>
-    <p:notesMasterId r:id="rId11"/>
+    <p:notesMasterId r:id="rId10"/>
   </p:notesMasterIdLst>
   <p:sldIdLst>
     <p:sldId id="256" r:id="rId2"/>
-    <p:sldId id="260" r:id="rId3"/>
-    <p:sldId id="259" r:id="rId4"/>
-    <p:sldId id="261" r:id="rId5"/>
-    <p:sldId id="264" r:id="rId6"/>
-    <p:sldId id="262" r:id="rId7"/>
-    <p:sldId id="263" r:id="rId8"/>
-    <p:sldId id="265" r:id="rId9"/>
-    <p:sldId id="266" r:id="rId10"/>
+    <p:sldId id="259" r:id="rId3"/>
+    <p:sldId id="261" r:id="rId4"/>
+    <p:sldId id="264" r:id="rId5"/>
+    <p:sldId id="262" r:id="rId6"/>
+    <p:sldId id="263" r:id="rId7"/>
+    <p:sldId id="265" r:id="rId8"/>
+    <p:sldId id="266" r:id="rId9"/>
   </p:sldIdLst>
   <p:sldSz cx="9144000" cy="6858000" type="screen4x3"/>
   <p:notesSz cx="6858000" cy="9144000"/>
@@ -370,7 +369,7 @@
     </p:spTree>
     <p:extLst>
       <p:ext uri="{BB962C8B-B14F-4D97-AF65-F5344CB8AC3E}">
-        <p14:creationId xmlns="" xmlns:p14="http://schemas.microsoft.com/office/powerpoint/2010/main" val="2972343617"/>
+        <p14:creationId xmlns:p14="http://schemas.microsoft.com/office/powerpoint/2010/main" val="2972343617"/>
       </p:ext>
     </p:extLst>
   </p:cSld>
@@ -536,7 +535,7 @@
             <a:fld id="{AE0E38BC-9E91-4F39-B9E2-C7AFA83CF676}" type="slidenum">
               <a:rPr lang="de-CH" smtClean="0"/>
               <a:pPr/>
-              <a:t>4</a:t>
+              <a:t>3</a:t>
             </a:fld>
             <a:endParaRPr lang="de-CH"/>
           </a:p>
@@ -545,7 +544,7 @@
     </p:spTree>
     <p:extLst>
       <p:ext uri="{BB962C8B-B14F-4D97-AF65-F5344CB8AC3E}">
-        <p14:creationId xmlns="" xmlns:p14="http://schemas.microsoft.com/office/powerpoint/2010/main" val="3710736518"/>
+        <p14:creationId xmlns:p14="http://schemas.microsoft.com/office/powerpoint/2010/main" val="3710736518"/>
       </p:ext>
     </p:extLst>
   </p:cSld>
@@ -789,7 +788,7 @@
     </p:spTree>
     <p:extLst>
       <p:ext uri="{BB962C8B-B14F-4D97-AF65-F5344CB8AC3E}">
-        <p14:creationId xmlns="" xmlns:p14="http://schemas.microsoft.com/office/powerpoint/2010/main" val="3418122388"/>
+        <p14:creationId xmlns:p14="http://schemas.microsoft.com/office/powerpoint/2010/main" val="3418122388"/>
       </p:ext>
     </p:extLst>
   </p:cSld>
@@ -961,7 +960,7 @@
     </p:spTree>
     <p:extLst>
       <p:ext uri="{BB962C8B-B14F-4D97-AF65-F5344CB8AC3E}">
-        <p14:creationId xmlns="" xmlns:p14="http://schemas.microsoft.com/office/powerpoint/2010/main" val="3819629253"/>
+        <p14:creationId xmlns:p14="http://schemas.microsoft.com/office/powerpoint/2010/main" val="3819629253"/>
       </p:ext>
     </p:extLst>
   </p:cSld>
@@ -1143,7 +1142,7 @@
     </p:spTree>
     <p:extLst>
       <p:ext uri="{BB962C8B-B14F-4D97-AF65-F5344CB8AC3E}">
-        <p14:creationId xmlns="" xmlns:p14="http://schemas.microsoft.com/office/powerpoint/2010/main" val="2835094207"/>
+        <p14:creationId xmlns:p14="http://schemas.microsoft.com/office/powerpoint/2010/main" val="2835094207"/>
       </p:ext>
     </p:extLst>
   </p:cSld>
@@ -1315,7 +1314,7 @@
     </p:spTree>
     <p:extLst>
       <p:ext uri="{BB962C8B-B14F-4D97-AF65-F5344CB8AC3E}">
-        <p14:creationId xmlns="" xmlns:p14="http://schemas.microsoft.com/office/powerpoint/2010/main" val="771690159"/>
+        <p14:creationId xmlns:p14="http://schemas.microsoft.com/office/powerpoint/2010/main" val="771690159"/>
       </p:ext>
     </p:extLst>
   </p:cSld>
@@ -1563,7 +1562,7 @@
     </p:spTree>
     <p:extLst>
       <p:ext uri="{BB962C8B-B14F-4D97-AF65-F5344CB8AC3E}">
-        <p14:creationId xmlns="" xmlns:p14="http://schemas.microsoft.com/office/powerpoint/2010/main" val="2076582155"/>
+        <p14:creationId xmlns:p14="http://schemas.microsoft.com/office/powerpoint/2010/main" val="2076582155"/>
       </p:ext>
     </p:extLst>
   </p:cSld>
@@ -1853,7 +1852,7 @@
     </p:spTree>
     <p:extLst>
       <p:ext uri="{BB962C8B-B14F-4D97-AF65-F5344CB8AC3E}">
-        <p14:creationId xmlns="" xmlns:p14="http://schemas.microsoft.com/office/powerpoint/2010/main" val="3446641067"/>
+        <p14:creationId xmlns:p14="http://schemas.microsoft.com/office/powerpoint/2010/main" val="3446641067"/>
       </p:ext>
     </p:extLst>
   </p:cSld>
@@ -2277,7 +2276,7 @@
     </p:spTree>
     <p:extLst>
       <p:ext uri="{BB962C8B-B14F-4D97-AF65-F5344CB8AC3E}">
-        <p14:creationId xmlns="" xmlns:p14="http://schemas.microsoft.com/office/powerpoint/2010/main" val="462116376"/>
+        <p14:creationId xmlns:p14="http://schemas.microsoft.com/office/powerpoint/2010/main" val="462116376"/>
       </p:ext>
     </p:extLst>
   </p:cSld>
@@ -2397,7 +2396,7 @@
     </p:spTree>
     <p:extLst>
       <p:ext uri="{BB962C8B-B14F-4D97-AF65-F5344CB8AC3E}">
-        <p14:creationId xmlns="" xmlns:p14="http://schemas.microsoft.com/office/powerpoint/2010/main" val="1435737667"/>
+        <p14:creationId xmlns:p14="http://schemas.microsoft.com/office/powerpoint/2010/main" val="1435737667"/>
       </p:ext>
     </p:extLst>
   </p:cSld>
@@ -2494,7 +2493,7 @@
     </p:spTree>
     <p:extLst>
       <p:ext uri="{BB962C8B-B14F-4D97-AF65-F5344CB8AC3E}">
-        <p14:creationId xmlns="" xmlns:p14="http://schemas.microsoft.com/office/powerpoint/2010/main" val="1293513797"/>
+        <p14:creationId xmlns:p14="http://schemas.microsoft.com/office/powerpoint/2010/main" val="1293513797"/>
       </p:ext>
     </p:extLst>
   </p:cSld>
@@ -2773,7 +2772,7 @@
     </p:spTree>
     <p:extLst>
       <p:ext uri="{BB962C8B-B14F-4D97-AF65-F5344CB8AC3E}">
-        <p14:creationId xmlns="" xmlns:p14="http://schemas.microsoft.com/office/powerpoint/2010/main" val="1000640820"/>
+        <p14:creationId xmlns:p14="http://schemas.microsoft.com/office/powerpoint/2010/main" val="1000640820"/>
       </p:ext>
     </p:extLst>
   </p:cSld>
@@ -3028,7 +3027,7 @@
     </p:spTree>
     <p:extLst>
       <p:ext uri="{BB962C8B-B14F-4D97-AF65-F5344CB8AC3E}">
-        <p14:creationId xmlns="" xmlns:p14="http://schemas.microsoft.com/office/powerpoint/2010/main" val="1924031751"/>
+        <p14:creationId xmlns:p14="http://schemas.microsoft.com/office/powerpoint/2010/main" val="1924031751"/>
       </p:ext>
     </p:extLst>
   </p:cSld>
@@ -3279,7 +3278,7 @@
     </p:spTree>
     <p:extLst>
       <p:ext uri="{BB962C8B-B14F-4D97-AF65-F5344CB8AC3E}">
-        <p14:creationId xmlns="" xmlns:p14="http://schemas.microsoft.com/office/powerpoint/2010/main" val="4106584478"/>
+        <p14:creationId xmlns:p14="http://schemas.microsoft.com/office/powerpoint/2010/main" val="4106584478"/>
       </p:ext>
     </p:extLst>
   </p:cSld>
@@ -3582,7 +3581,18 @@
           <a:bodyPr/>
           <a:lstStyle/>
           <a:p>
-            <a:endParaRPr lang="de-CH"/>
+            <a:r>
+              <a:rPr lang="de-CH" dirty="0" smtClean="0"/>
+              <a:t>ARM Cortex &amp; Events</a:t>
+            </a:r>
+            <a:br>
+              <a:rPr lang="de-CH" dirty="0" smtClean="0"/>
+            </a:br>
+            <a:r>
+              <a:rPr lang="de-CH" dirty="0" err="1" smtClean="0"/>
+              <a:t>Recap</a:t>
+            </a:r>
+            <a:endParaRPr lang="de-CH" dirty="0"/>
           </a:p>
         </p:txBody>
       </p:sp>
@@ -3596,19 +3606,30 @@
             <p:ph type="subTitle" idx="1"/>
           </p:nvPr>
         </p:nvSpPr>
-        <p:spPr/>
-        <p:txBody>
-          <a:bodyPr/>
-          <a:lstStyle/>
-          <a:p>
-            <a:endParaRPr lang="de-CH"/>
+        <p:spPr>
+          <a:xfrm>
+            <a:off x="1371600" y="4822304"/>
+            <a:ext cx="6400800" cy="982960"/>
+          </a:xfrm>
+        </p:spPr>
+        <p:txBody>
+          <a:bodyPr>
+            <a:normAutofit/>
+          </a:bodyPr>
+          <a:lstStyle/>
+          <a:p>
+            <a:r>
+              <a:rPr lang="de-CH" sz="2800" dirty="0" smtClean="0"/>
+              <a:t>Bettina Wyss, Yves Studer, Michèle Rey</a:t>
+            </a:r>
+            <a:endParaRPr lang="de-CH" sz="2800" dirty="0"/>
           </a:p>
         </p:txBody>
       </p:sp>
     </p:spTree>
     <p:extLst>
       <p:ext uri="{BB962C8B-B14F-4D97-AF65-F5344CB8AC3E}">
-        <p14:creationId xmlns="" xmlns:p14="http://schemas.microsoft.com/office/powerpoint/2010/main" val="2670384790"/>
+        <p14:creationId xmlns:p14="http://schemas.microsoft.com/office/powerpoint/2010/main" val="2670384790"/>
       </p:ext>
     </p:extLst>
   </p:cSld>
@@ -3626,184 +3647,6 @@
 </file>
 
 <file path=ppt/slides/slide2.xml><?xml version="1.0" encoding="utf-8"?>
-<p:sld xmlns:a="http://schemas.openxmlformats.org/drawingml/2006/main" xmlns:r="http://schemas.openxmlformats.org/officeDocument/2006/relationships" xmlns:p="http://schemas.openxmlformats.org/presentationml/2006/main" show="0">
-  <p:cSld>
-    <p:spTree>
-      <p:nvGrpSpPr>
-        <p:cNvPr id="1" name=""/>
-        <p:cNvGrpSpPr/>
-        <p:nvPr/>
-      </p:nvGrpSpPr>
-      <p:grpSpPr>
-        <a:xfrm>
-          <a:off x="0" y="0"/>
-          <a:ext cx="0" cy="0"/>
-          <a:chOff x="0" y="0"/>
-          <a:chExt cx="0" cy="0"/>
-        </a:xfrm>
-      </p:grpSpPr>
-      <p:sp>
-        <p:nvSpPr>
-          <p:cNvPr id="2" name="Titel 1"/>
-          <p:cNvSpPr>
-            <a:spLocks noGrp="1"/>
-          </p:cNvSpPr>
-          <p:nvPr>
-            <p:ph type="title"/>
-          </p:nvPr>
-        </p:nvSpPr>
-        <p:spPr/>
-        <p:txBody>
-          <a:bodyPr/>
-          <a:lstStyle/>
-          <a:p>
-            <a:r>
-              <a:rPr lang="de-CH" dirty="0" smtClean="0"/>
-              <a:t>Register</a:t>
-            </a:r>
-            <a:endParaRPr lang="de-CH" dirty="0"/>
-          </a:p>
-        </p:txBody>
-      </p:sp>
-      <p:sp>
-        <p:nvSpPr>
-          <p:cNvPr id="3" name="Inhaltsplatzhalter 2"/>
-          <p:cNvSpPr>
-            <a:spLocks noGrp="1"/>
-          </p:cNvSpPr>
-          <p:nvPr>
-            <p:ph idx="1"/>
-          </p:nvPr>
-        </p:nvSpPr>
-        <p:spPr/>
-        <p:txBody>
-          <a:bodyPr/>
-          <a:lstStyle/>
-          <a:p>
-            <a:r>
-              <a:rPr lang="de-CH" sz="2800" dirty="0"/>
-              <a:t>R0 – R12: General </a:t>
-            </a:r>
-            <a:r>
-              <a:rPr lang="de-CH" sz="2800" dirty="0" err="1"/>
-              <a:t>Purpose</a:t>
-            </a:r>
-            <a:r>
-              <a:rPr lang="de-CH" sz="2800" dirty="0"/>
-              <a:t> </a:t>
-            </a:r>
-            <a:r>
-              <a:rPr lang="de-CH" sz="2800" dirty="0" smtClean="0"/>
-              <a:t>Register</a:t>
-            </a:r>
-          </a:p>
-          <a:p>
-            <a:r>
-              <a:rPr lang="de-CH" sz="2800" dirty="0"/>
-              <a:t>R13</a:t>
-            </a:r>
-            <a:r>
-              <a:rPr lang="de-CH" sz="2800" dirty="0" smtClean="0"/>
-              <a:t>: MSP und PSP</a:t>
-            </a:r>
-          </a:p>
-          <a:p>
-            <a:r>
-              <a:rPr lang="de-CH" sz="2800" dirty="0"/>
-              <a:t>R14: Link </a:t>
-            </a:r>
-            <a:r>
-              <a:rPr lang="de-CH" sz="2800" dirty="0" smtClean="0"/>
-              <a:t>Register (</a:t>
-            </a:r>
-            <a:r>
-              <a:rPr lang="de-CH" sz="2800" dirty="0" err="1" smtClean="0"/>
-              <a:t>Odd</a:t>
-            </a:r>
-            <a:r>
-              <a:rPr lang="de-CH" sz="2800" dirty="0" smtClean="0"/>
-              <a:t> </a:t>
-            </a:r>
-            <a:r>
-              <a:rPr lang="de-CH" sz="2800" dirty="0" err="1" smtClean="0"/>
-              <a:t>bit</a:t>
-            </a:r>
-            <a:r>
-              <a:rPr lang="de-CH" sz="2800" dirty="0" smtClean="0"/>
-              <a:t> =&gt; THUMB)</a:t>
-            </a:r>
-          </a:p>
-          <a:p>
-            <a:r>
-              <a:rPr lang="de-CH" sz="2800" dirty="0"/>
-              <a:t>R15: </a:t>
-            </a:r>
-            <a:r>
-              <a:rPr lang="de-CH" sz="2800" dirty="0" smtClean="0"/>
-              <a:t>PC</a:t>
-            </a:r>
-          </a:p>
-          <a:p>
-            <a:r>
-              <a:rPr lang="de-CH" sz="2800" dirty="0"/>
-              <a:t>CPSR: </a:t>
-            </a:r>
-            <a:r>
-              <a:rPr lang="de-CH" sz="2800" dirty="0" err="1"/>
-              <a:t>Current</a:t>
-            </a:r>
-            <a:r>
-              <a:rPr lang="de-CH" sz="2800" dirty="0"/>
-              <a:t> </a:t>
-            </a:r>
-            <a:r>
-              <a:rPr lang="de-CH" sz="2800" dirty="0" err="1"/>
-              <a:t>Program</a:t>
-            </a:r>
-            <a:r>
-              <a:rPr lang="de-CH" sz="2800" dirty="0"/>
-              <a:t> Status Register</a:t>
-            </a:r>
-          </a:p>
-          <a:p>
-            <a:endParaRPr lang="de-CH" dirty="0"/>
-          </a:p>
-          <a:p>
-            <a:endParaRPr lang="de-CH" dirty="0"/>
-          </a:p>
-          <a:p>
-            <a:endParaRPr lang="de-CH" dirty="0" smtClean="0"/>
-          </a:p>
-          <a:p>
-            <a:endParaRPr lang="de-CH" dirty="0"/>
-          </a:p>
-          <a:p>
-            <a:endParaRPr lang="de-CH" dirty="0"/>
-          </a:p>
-        </p:txBody>
-      </p:sp>
-    </p:spTree>
-    <p:extLst>
-      <p:ext uri="{BB962C8B-B14F-4D97-AF65-F5344CB8AC3E}">
-        <p14:creationId xmlns="" xmlns:p14="http://schemas.microsoft.com/office/powerpoint/2010/main" val="435465797"/>
-      </p:ext>
-    </p:extLst>
-  </p:cSld>
-  <p:clrMapOvr>
-    <a:masterClrMapping/>
-  </p:clrMapOvr>
-  <mc:AlternateContent xmlns:mc="http://schemas.openxmlformats.org/markup-compatibility/2006">
-    <mc:Choice xmlns="" xmlns:p14="http://schemas.microsoft.com/office/powerpoint/2010/main" Requires="p14">
-      <p:transition spd="slow" p14:dur="2000"/>
-    </mc:Choice>
-    <mc:Fallback>
-      <p:transition spd="slow"/>
-    </mc:Fallback>
-  </mc:AlternateContent>
-</p:sld>
-</file>
-
-<file path=ppt/slides/slide3.xml><?xml version="1.0" encoding="utf-8"?>
 <p:sld xmlns:a="http://schemas.openxmlformats.org/drawingml/2006/main" xmlns:r="http://schemas.openxmlformats.org/officeDocument/2006/relationships" xmlns:p="http://schemas.openxmlformats.org/presentationml/2006/main">
   <p:cSld>
     <p:spTree>
@@ -3832,7 +3675,7 @@
           <a:blip r:embed="rId2" cstate="print">
             <a:extLst>
               <a:ext uri="{28A0092B-C50C-407E-A947-70E740481C1C}">
-                <a14:useLocalDpi xmlns="" xmlns:a14="http://schemas.microsoft.com/office/drawing/2010/main" val="0"/>
+                <a14:useLocalDpi xmlns:a14="http://schemas.microsoft.com/office/drawing/2010/main" val="0"/>
               </a:ext>
             </a:extLst>
           </a:blip>
@@ -3954,7 +3797,168 @@
     </p:spTree>
     <p:extLst>
       <p:ext uri="{BB962C8B-B14F-4D97-AF65-F5344CB8AC3E}">
-        <p14:creationId xmlns="" xmlns:p14="http://schemas.microsoft.com/office/powerpoint/2010/main" val="4086224160"/>
+        <p14:creationId xmlns:p14="http://schemas.microsoft.com/office/powerpoint/2010/main" val="4086224160"/>
+      </p:ext>
+    </p:extLst>
+  </p:cSld>
+  <p:clrMapOvr>
+    <a:masterClrMapping/>
+  </p:clrMapOvr>
+  <p:timing>
+    <p:tnLst>
+      <p:par>
+        <p:cTn id="1" dur="indefinite" restart="never" nodeType="tmRoot"/>
+      </p:par>
+    </p:tnLst>
+  </p:timing>
+</p:sld>
+</file>
+
+<file path=ppt/slides/slide3.xml><?xml version="1.0" encoding="utf-8"?>
+<p:sld xmlns:a="http://schemas.openxmlformats.org/drawingml/2006/main" xmlns:r="http://schemas.openxmlformats.org/officeDocument/2006/relationships" xmlns:p="http://schemas.openxmlformats.org/presentationml/2006/main">
+  <p:cSld>
+    <p:spTree>
+      <p:nvGrpSpPr>
+        <p:cNvPr id="1" name=""/>
+        <p:cNvGrpSpPr/>
+        <p:nvPr/>
+      </p:nvGrpSpPr>
+      <p:grpSpPr>
+        <a:xfrm>
+          <a:off x="0" y="0"/>
+          <a:ext cx="0" cy="0"/>
+          <a:chOff x="0" y="0"/>
+          <a:chExt cx="0" cy="0"/>
+        </a:xfrm>
+      </p:grpSpPr>
+      <p:sp>
+        <p:nvSpPr>
+          <p:cNvPr id="3" name="Inhaltsplatzhalter 2"/>
+          <p:cNvSpPr>
+            <a:spLocks noGrp="1"/>
+          </p:cNvSpPr>
+          <p:nvPr>
+            <p:ph idx="1"/>
+          </p:nvPr>
+        </p:nvSpPr>
+        <p:spPr/>
+        <p:txBody>
+          <a:bodyPr>
+            <a:normAutofit/>
+          </a:bodyPr>
+          <a:lstStyle/>
+          <a:p>
+            <a:r>
+              <a:rPr lang="de-CH" sz="2400" dirty="0" smtClean="0"/>
+              <a:t>Bis zu 8 IR </a:t>
+            </a:r>
+            <a:r>
+              <a:rPr lang="de-CH" sz="2400" dirty="0" err="1" smtClean="0"/>
+              <a:t>Priority</a:t>
+            </a:r>
+            <a:r>
+              <a:rPr lang="de-CH" sz="2400" dirty="0" smtClean="0"/>
+              <a:t> </a:t>
+            </a:r>
+            <a:r>
+              <a:rPr lang="de-CH" sz="2400" dirty="0" err="1"/>
+              <a:t>b</a:t>
+            </a:r>
+            <a:r>
+              <a:rPr lang="de-CH" sz="2400" dirty="0" err="1" smtClean="0"/>
+              <a:t>its</a:t>
+            </a:r>
+            <a:r>
+              <a:rPr lang="de-CH" sz="2400" dirty="0" smtClean="0"/>
+              <a:t> möglich:</a:t>
+            </a:r>
+            <a:br>
+              <a:rPr lang="de-CH" sz="2400" dirty="0" smtClean="0"/>
+            </a:br>
+            <a:r>
+              <a:rPr lang="de-CH" sz="2400" dirty="0" smtClean="0"/>
+              <a:t>- M0: mind. 2bits</a:t>
+            </a:r>
+            <a:br>
+              <a:rPr lang="de-CH" sz="2400" dirty="0" smtClean="0"/>
+            </a:br>
+            <a:r>
+              <a:rPr lang="de-CH" sz="2400" dirty="0" smtClean="0"/>
+              <a:t>- M3/M4: mind. 3bits</a:t>
+            </a:r>
+          </a:p>
+          <a:p>
+            <a:endParaRPr lang="de-CH" sz="2400" dirty="0" smtClean="0"/>
+          </a:p>
+          <a:p>
+            <a:r>
+              <a:rPr lang="de-CH" sz="2400" dirty="0" smtClean="0"/>
+              <a:t>M3/M4 mit Haupt- und Subprioritäten</a:t>
+            </a:r>
+          </a:p>
+        </p:txBody>
+      </p:sp>
+      <p:pic>
+        <p:nvPicPr>
+          <p:cNvPr id="4" name="Grafik 3" descr="Bildschirmausschnitt"/>
+          <p:cNvPicPr>
+            <a:picLocks noChangeAspect="1"/>
+          </p:cNvPicPr>
+          <p:nvPr/>
+        </p:nvPicPr>
+        <p:blipFill>
+          <a:blip r:embed="rId3" cstate="print">
+            <a:extLst>
+              <a:ext uri="{28A0092B-C50C-407E-A947-70E740481C1C}">
+                <a14:useLocalDpi xmlns:a14="http://schemas.microsoft.com/office/drawing/2010/main" val="0"/>
+              </a:ext>
+            </a:extLst>
+          </a:blip>
+          <a:stretch>
+            <a:fillRect/>
+          </a:stretch>
+        </p:blipFill>
+        <p:spPr>
+          <a:xfrm>
+            <a:off x="886272" y="3933056"/>
+            <a:ext cx="5718325" cy="956881"/>
+          </a:xfrm>
+          <a:prstGeom prst="rect">
+            <a:avLst/>
+          </a:prstGeom>
+        </p:spPr>
+      </p:pic>
+      <p:sp>
+        <p:nvSpPr>
+          <p:cNvPr id="2" name="Titel 1"/>
+          <p:cNvSpPr>
+            <a:spLocks noGrp="1"/>
+          </p:cNvSpPr>
+          <p:nvPr>
+            <p:ph type="title"/>
+          </p:nvPr>
+        </p:nvSpPr>
+        <p:spPr/>
+        <p:txBody>
+          <a:bodyPr/>
+          <a:lstStyle/>
+          <a:p>
+            <a:r>
+              <a:rPr lang="de-CH" dirty="0"/>
+              <a:t>Prioritäten und </a:t>
+            </a:r>
+            <a:r>
+              <a:rPr lang="de-CH" dirty="0" err="1"/>
+              <a:t>Exceptions</a:t>
+            </a:r>
+            <a:endParaRPr lang="de-CH" dirty="0"/>
+          </a:p>
+        </p:txBody>
+      </p:sp>
+    </p:spTree>
+    <p:extLst>
+      <p:ext uri="{BB962C8B-B14F-4D97-AF65-F5344CB8AC3E}">
+        <p14:creationId xmlns:p14="http://schemas.microsoft.com/office/powerpoint/2010/main" val="2654074023"/>
       </p:ext>
     </p:extLst>
   </p:cSld>
@@ -3990,12 +3994,12 @@
       </p:grpSpPr>
       <p:sp>
         <p:nvSpPr>
-          <p:cNvPr id="3" name="Inhaltsplatzhalter 2"/>
-          <p:cNvSpPr>
-            <a:spLocks noGrp="1"/>
-          </p:cNvSpPr>
-          <p:nvPr>
-            <p:ph idx="1"/>
+          <p:cNvPr id="2" name="Titel 1"/>
+          <p:cNvSpPr>
+            <a:spLocks noGrp="1"/>
+          </p:cNvSpPr>
+          <p:nvPr>
+            <p:ph type="title"/>
           </p:nvPr>
         </p:nvSpPr>
         <p:spPr/>
@@ -4006,52 +4010,106 @@
           <a:lstStyle/>
           <a:p>
             <a:r>
+              <a:rPr lang="de-CH" dirty="0" smtClean="0"/>
+              <a:t>NVIC – </a:t>
+            </a:r>
+            <a:r>
+              <a:rPr lang="de-CH" dirty="0" err="1" smtClean="0"/>
+              <a:t>Nested</a:t>
+            </a:r>
+            <a:r>
+              <a:rPr lang="de-CH" dirty="0" smtClean="0"/>
+              <a:t> </a:t>
+            </a:r>
+            <a:r>
+              <a:rPr lang="de-CH" dirty="0" err="1" smtClean="0"/>
+              <a:t>Vector</a:t>
+            </a:r>
+            <a:r>
+              <a:rPr lang="de-CH" dirty="0" smtClean="0"/>
+              <a:t> IR Controller</a:t>
+            </a:r>
+            <a:endParaRPr lang="de-CH" dirty="0"/>
+          </a:p>
+        </p:txBody>
+      </p:sp>
+      <p:sp>
+        <p:nvSpPr>
+          <p:cNvPr id="3" name="Inhaltsplatzhalter 2"/>
+          <p:cNvSpPr>
+            <a:spLocks noGrp="1"/>
+          </p:cNvSpPr>
+          <p:nvPr>
+            <p:ph idx="1"/>
+          </p:nvPr>
+        </p:nvSpPr>
+        <p:spPr/>
+        <p:txBody>
+          <a:bodyPr/>
+          <a:lstStyle/>
+          <a:p>
+            <a:r>
               <a:rPr lang="de-CH" sz="2400" dirty="0" smtClean="0"/>
-              <a:t>Bis zu 8 IR </a:t>
-            </a:r>
-            <a:r>
-              <a:rPr lang="de-CH" sz="2400" dirty="0" err="1" smtClean="0"/>
-              <a:t>Priority</a:t>
-            </a:r>
+              <a:t>32bit Register</a:t>
+            </a:r>
+          </a:p>
+          <a:p>
             <a:r>
               <a:rPr lang="de-CH" sz="2400" dirty="0" smtClean="0"/>
-              <a:t> </a:t>
+              <a:t>einfaches </a:t>
+            </a:r>
+            <a:r>
+              <a:rPr lang="de-CH" sz="2400" dirty="0"/>
+              <a:t>en-/</a:t>
             </a:r>
             <a:r>
               <a:rPr lang="de-CH" sz="2400" dirty="0" err="1"/>
-              <a:t>b</a:t>
-            </a:r>
-            <a:r>
-              <a:rPr lang="de-CH" sz="2400" dirty="0" err="1" smtClean="0"/>
-              <a:t>its</a:t>
+              <a:t>disablen</a:t>
+            </a:r>
+            <a:r>
+              <a:rPr lang="de-CH" sz="2400" dirty="0"/>
+              <a:t> von IR (</a:t>
+            </a:r>
+            <a:r>
+              <a:rPr lang="de-CH" sz="2000" dirty="0"/>
+              <a:t>NVIC_ISER / NVIC_ICER</a:t>
             </a:r>
             <a:r>
               <a:rPr lang="de-CH" sz="2400" dirty="0" smtClean="0"/>
-              <a:t> möglich:</a:t>
-            </a:r>
-            <a:br>
+              <a:t>)</a:t>
+            </a:r>
+          </a:p>
+          <a:p>
+            <a:r>
               <a:rPr lang="de-CH" sz="2400" dirty="0" smtClean="0"/>
-            </a:br>
+              <a:t>M4</a:t>
+            </a:r>
+            <a:r>
+              <a:rPr lang="de-CH" sz="2400" dirty="0"/>
+              <a:t>: zusätzlich Interrupt </a:t>
+            </a:r>
+            <a:r>
+              <a:rPr lang="de-CH" sz="2400" dirty="0" err="1"/>
+              <a:t>Active</a:t>
+            </a:r>
+            <a:r>
+              <a:rPr lang="de-CH" sz="2400" dirty="0"/>
+              <a:t> Bit Register (</a:t>
+            </a:r>
+            <a:r>
+              <a:rPr lang="de-CH" sz="2000" dirty="0"/>
+              <a:t>NVIC_IABR</a:t>
+            </a:r>
             <a:r>
               <a:rPr lang="de-CH" sz="2400" dirty="0" smtClean="0"/>
-              <a:t>- M0: mind. 2bits</a:t>
-            </a:r>
-            <a:br>
-              <a:rPr lang="de-CH" sz="2400" dirty="0" smtClean="0"/>
-            </a:br>
-            <a:r>
-              <a:rPr lang="de-CH" sz="2400" dirty="0" smtClean="0"/>
-              <a:t>- M3/M4: mind. 3bits</a:t>
-            </a:r>
-          </a:p>
-          <a:p>
-            <a:endParaRPr lang="de-CH" sz="2400" dirty="0" smtClean="0"/>
-          </a:p>
-          <a:p>
-            <a:r>
-              <a:rPr lang="de-CH" sz="2400" dirty="0" smtClean="0"/>
-              <a:t>M3/M4 mit Haupt- und Subprioritäten</a:t>
-            </a:r>
+              <a:t>)</a:t>
+            </a:r>
+          </a:p>
+          <a:p>
+            <a:endParaRPr lang="de-CH" sz="2800" dirty="0"/>
+          </a:p>
+          <a:p>
+            <a:endParaRPr lang="de-CH" dirty="0"/>
           </a:p>
         </p:txBody>
       </p:sp>
@@ -4064,10 +4122,10 @@
           <p:nvPr/>
         </p:nvPicPr>
         <p:blipFill>
-          <a:blip r:embed="rId3" cstate="print">
+          <a:blip r:embed="rId2" cstate="print">
             <a:extLst>
               <a:ext uri="{28A0092B-C50C-407E-A947-70E740481C1C}">
-                <a14:useLocalDpi xmlns="" xmlns:a14="http://schemas.microsoft.com/office/drawing/2010/main" val="0"/>
+                <a14:useLocalDpi xmlns:a14="http://schemas.microsoft.com/office/drawing/2010/main" val="0"/>
               </a:ext>
             </a:extLst>
           </a:blip>
@@ -4077,45 +4135,18 @@
         </p:blipFill>
         <p:spPr>
           <a:xfrm>
-            <a:off x="886272" y="3933056"/>
-            <a:ext cx="5718325" cy="956881"/>
+            <a:off x="899592" y="3356992"/>
+            <a:ext cx="7236296" cy="2276819"/>
           </a:xfrm>
           <a:prstGeom prst="rect">
             <a:avLst/>
           </a:prstGeom>
         </p:spPr>
       </p:pic>
-      <p:sp>
-        <p:nvSpPr>
-          <p:cNvPr id="2" name="Titel 1"/>
-          <p:cNvSpPr>
-            <a:spLocks noGrp="1"/>
-          </p:cNvSpPr>
-          <p:nvPr>
-            <p:ph type="title"/>
-          </p:nvPr>
-        </p:nvSpPr>
-        <p:spPr/>
-        <p:txBody>
-          <a:bodyPr/>
-          <a:lstStyle/>
-          <a:p>
-            <a:r>
-              <a:rPr lang="de-CH" dirty="0"/>
-              <a:t>Prioritäten und </a:t>
-            </a:r>
-            <a:r>
-              <a:rPr lang="de-CH" dirty="0" err="1"/>
-              <a:t>Exceptions</a:t>
-            </a:r>
-            <a:endParaRPr lang="de-CH" dirty="0"/>
-          </a:p>
-        </p:txBody>
-      </p:sp>
     </p:spTree>
     <p:extLst>
       <p:ext uri="{BB962C8B-B14F-4D97-AF65-F5344CB8AC3E}">
-        <p14:creationId xmlns="" xmlns:p14="http://schemas.microsoft.com/office/powerpoint/2010/main" val="2654074023"/>
+        <p14:creationId xmlns:p14="http://schemas.microsoft.com/office/powerpoint/2010/main" val="69236346"/>
       </p:ext>
     </p:extLst>
   </p:cSld>
@@ -4161,149 +4192,130 @@
         </p:nvSpPr>
         <p:spPr/>
         <p:txBody>
+          <a:bodyPr/>
+          <a:lstStyle/>
+          <a:p>
+            <a:r>
+              <a:rPr lang="de-CH" dirty="0" smtClean="0"/>
+              <a:t>Fault </a:t>
+            </a:r>
+            <a:r>
+              <a:rPr lang="de-CH" dirty="0" err="1" smtClean="0"/>
+              <a:t>Exceptions</a:t>
+            </a:r>
+            <a:endParaRPr lang="de-CH" dirty="0"/>
+          </a:p>
+        </p:txBody>
+      </p:sp>
+      <p:sp>
+        <p:nvSpPr>
+          <p:cNvPr id="3" name="Inhaltsplatzhalter 2"/>
+          <p:cNvSpPr>
+            <a:spLocks noGrp="1"/>
+          </p:cNvSpPr>
+          <p:nvPr>
+            <p:ph idx="1"/>
+          </p:nvPr>
+        </p:nvSpPr>
+        <p:spPr/>
+        <p:txBody>
           <a:bodyPr>
             <a:normAutofit/>
           </a:bodyPr>
           <a:lstStyle/>
           <a:p>
             <a:r>
-              <a:rPr lang="de-CH" dirty="0" smtClean="0"/>
-              <a:t>NVIC – </a:t>
-            </a:r>
-            <a:r>
-              <a:rPr lang="de-CH" dirty="0" err="1" smtClean="0"/>
-              <a:t>Nested</a:t>
-            </a:r>
-            <a:r>
-              <a:rPr lang="de-CH" dirty="0" smtClean="0"/>
+              <a:rPr lang="de-CH" sz="2400" dirty="0" smtClean="0"/>
+              <a:t>Bus Fault</a:t>
+            </a:r>
+          </a:p>
+          <a:p>
+            <a:r>
+              <a:rPr lang="de-CH" sz="2400" dirty="0" smtClean="0"/>
+              <a:t>Memory Fault</a:t>
+            </a:r>
+          </a:p>
+          <a:p>
+            <a:r>
+              <a:rPr lang="de-CH" sz="2400" dirty="0" err="1" smtClean="0"/>
+              <a:t>Usage</a:t>
+            </a:r>
+            <a:r>
+              <a:rPr lang="de-CH" sz="2400" dirty="0" smtClean="0"/>
+              <a:t> Fault</a:t>
+            </a:r>
+          </a:p>
+          <a:p>
+            <a:endParaRPr lang="de-CH" sz="2400" dirty="0"/>
+          </a:p>
+          <a:p>
+            <a:pPr marL="0" indent="0">
+              <a:buNone/>
+            </a:pPr>
+            <a:r>
+              <a:rPr lang="de-CH" sz="2400" dirty="0" smtClean="0"/>
+              <a:t>	Behandlung solcher </a:t>
+            </a:r>
+            <a:r>
+              <a:rPr lang="de-CH" sz="2400" dirty="0" err="1" smtClean="0"/>
+              <a:t>Faults</a:t>
+            </a:r>
+            <a:r>
+              <a:rPr lang="de-CH" sz="2400" dirty="0" smtClean="0"/>
               <a:t> </a:t>
             </a:r>
             <a:r>
-              <a:rPr lang="de-CH" dirty="0" err="1" smtClean="0"/>
-              <a:t>Vector</a:t>
-            </a:r>
-            <a:r>
-              <a:rPr lang="de-CH" dirty="0" smtClean="0"/>
-              <a:t> IR Controller</a:t>
-            </a:r>
-            <a:endParaRPr lang="de-CH" dirty="0"/>
-          </a:p>
-        </p:txBody>
-      </p:sp>
-      <p:sp>
-        <p:nvSpPr>
-          <p:cNvPr id="3" name="Inhaltsplatzhalter 2"/>
-          <p:cNvSpPr>
-            <a:spLocks noGrp="1"/>
-          </p:cNvSpPr>
-          <p:nvPr>
-            <p:ph idx="1"/>
-          </p:nvPr>
-        </p:nvSpPr>
-        <p:spPr/>
-        <p:txBody>
-          <a:bodyPr/>
-          <a:lstStyle/>
-          <a:p>
-            <a:r>
               <a:rPr lang="de-CH" sz="2400" dirty="0" smtClean="0"/>
-              <a:t>32bit Register</a:t>
-            </a:r>
-          </a:p>
-          <a:p>
-            <a:r>
-              <a:rPr lang="de-CH" sz="2400" dirty="0" smtClean="0"/>
-              <a:t>einfaches </a:t>
-            </a:r>
-            <a:r>
-              <a:rPr lang="de-CH" sz="2400" dirty="0"/>
-              <a:t>en-/</a:t>
-            </a:r>
-            <a:r>
-              <a:rPr lang="de-CH" sz="2400" dirty="0" err="1"/>
-              <a:t>disablen</a:t>
-            </a:r>
-            <a:r>
-              <a:rPr lang="de-CH" sz="2400" dirty="0"/>
-              <a:t> von IR (</a:t>
-            </a:r>
-            <a:r>
-              <a:rPr lang="de-CH" sz="2000" dirty="0"/>
-              <a:t>NVIC_ISER / NVIC_ICER</a:t>
-            </a:r>
-            <a:r>
-              <a:rPr lang="de-CH" sz="2400" dirty="0" smtClean="0"/>
-              <a:t>)</a:t>
-            </a:r>
-          </a:p>
-          <a:p>
-            <a:r>
-              <a:rPr lang="de-CH" sz="2400" dirty="0" smtClean="0"/>
-              <a:t>M4</a:t>
-            </a:r>
-            <a:r>
-              <a:rPr lang="de-CH" sz="2400" dirty="0"/>
-              <a:t>: zusätzlich Interrupt </a:t>
-            </a:r>
-            <a:r>
-              <a:rPr lang="de-CH" sz="2400" dirty="0" err="1"/>
-              <a:t>Active</a:t>
-            </a:r>
-            <a:r>
-              <a:rPr lang="de-CH" sz="2400" dirty="0"/>
-              <a:t> Bit Register (</a:t>
-            </a:r>
-            <a:r>
-              <a:rPr lang="de-CH" sz="2000" dirty="0"/>
-              <a:t>NVIC_IABR</a:t>
-            </a:r>
-            <a:r>
-              <a:rPr lang="de-CH" sz="2400" dirty="0" smtClean="0"/>
-              <a:t>)</a:t>
-            </a:r>
-          </a:p>
-          <a:p>
-            <a:endParaRPr lang="de-CH" sz="2800" dirty="0"/>
-          </a:p>
-          <a:p>
-            <a:endParaRPr lang="de-CH" dirty="0"/>
-          </a:p>
-        </p:txBody>
-      </p:sp>
-      <p:pic>
-        <p:nvPicPr>
-          <p:cNvPr id="4" name="Grafik 3" descr="Bildschirmausschnitt"/>
-          <p:cNvPicPr>
-            <a:picLocks noChangeAspect="1"/>
-          </p:cNvPicPr>
+              <a:t>schwierig, da Debugger nicht aufzeigen kann, wo der Fehler im Code liegt.</a:t>
+            </a:r>
+            <a:endParaRPr lang="de-CH" sz="2400" dirty="0"/>
+          </a:p>
+        </p:txBody>
+      </p:sp>
+      <p:sp>
+        <p:nvSpPr>
+          <p:cNvPr id="4" name="Pfeil nach rechts 3"/>
+          <p:cNvSpPr/>
           <p:nvPr/>
-        </p:nvPicPr>
-        <p:blipFill>
-          <a:blip r:embed="rId2" cstate="print">
-            <a:extLst>
-              <a:ext uri="{28A0092B-C50C-407E-A947-70E740481C1C}">
-                <a14:useLocalDpi xmlns="" xmlns:a14="http://schemas.microsoft.com/office/drawing/2010/main" val="0"/>
-              </a:ext>
-            </a:extLst>
-          </a:blip>
-          <a:stretch>
-            <a:fillRect/>
-          </a:stretch>
-        </p:blipFill>
+        </p:nvSpPr>
         <p:spPr>
           <a:xfrm>
-            <a:off x="899592" y="3356992"/>
-            <a:ext cx="7236296" cy="2276819"/>
+            <a:off x="611560" y="3501008"/>
+            <a:ext cx="576064" cy="216024"/>
           </a:xfrm>
-          <a:prstGeom prst="rect">
+          <a:prstGeom prst="rightArrow">
             <a:avLst/>
           </a:prstGeom>
         </p:spPr>
-      </p:pic>
+        <p:style>
+          <a:lnRef idx="2">
+            <a:schemeClr val="accent1">
+              <a:shade val="50000"/>
+            </a:schemeClr>
+          </a:lnRef>
+          <a:fillRef idx="1">
+            <a:schemeClr val="accent1"/>
+          </a:fillRef>
+          <a:effectRef idx="0">
+            <a:schemeClr val="accent1"/>
+          </a:effectRef>
+          <a:fontRef idx="minor">
+            <a:schemeClr val="lt1"/>
+          </a:fontRef>
+        </p:style>
+        <p:txBody>
+          <a:bodyPr rtlCol="0" anchor="ctr"/>
+          <a:lstStyle/>
+          <a:p>
+            <a:pPr algn="ctr"/>
+            <a:endParaRPr lang="de-CH"/>
+          </a:p>
+        </p:txBody>
+      </p:sp>
     </p:spTree>
     <p:extLst>
       <p:ext uri="{BB962C8B-B14F-4D97-AF65-F5344CB8AC3E}">
-        <p14:creationId xmlns="" xmlns:p14="http://schemas.microsoft.com/office/powerpoint/2010/main" val="69236346"/>
+        <p14:creationId xmlns:p14="http://schemas.microsoft.com/office/powerpoint/2010/main" val="447240795"/>
       </p:ext>
     </p:extLst>
   </p:cSld>
@@ -4354,11 +4366,7 @@
           <a:p>
             <a:r>
               <a:rPr lang="de-CH" dirty="0" smtClean="0"/>
-              <a:t>Fault </a:t>
-            </a:r>
-            <a:r>
-              <a:rPr lang="de-CH" dirty="0" err="1" smtClean="0"/>
-              <a:t>Exceptions</a:t>
+              <a:t>Hard Fault Handler</a:t>
             </a:r>
             <a:endParaRPr lang="de-CH" dirty="0"/>
           </a:p>
@@ -4382,179 +4390,20 @@
           <a:lstStyle/>
           <a:p>
             <a:r>
-              <a:rPr lang="de-CH" sz="2400" dirty="0" smtClean="0"/>
-              <a:t>Bus Fault</a:t>
-            </a:r>
-          </a:p>
-          <a:p>
-            <a:r>
-              <a:rPr lang="de-CH" sz="2400" dirty="0" smtClean="0"/>
-              <a:t>Memory Fault</a:t>
-            </a:r>
-          </a:p>
-          <a:p>
-            <a:r>
-              <a:rPr lang="de-CH" sz="2400" dirty="0" err="1" smtClean="0"/>
-              <a:t>Usage</a:t>
-            </a:r>
-            <a:r>
-              <a:rPr lang="de-CH" sz="2400" dirty="0" smtClean="0"/>
-              <a:t> Fault</a:t>
-            </a:r>
-          </a:p>
-          <a:p>
-            <a:r>
-              <a:rPr lang="de-CH" sz="2400" dirty="0" smtClean="0"/>
-              <a:t>Hard Fault</a:t>
-            </a:r>
-          </a:p>
-          <a:p>
-            <a:endParaRPr lang="de-CH" sz="2400" dirty="0"/>
-          </a:p>
-          <a:p>
-            <a:pPr marL="0" indent="0">
-              <a:buNone/>
-            </a:pPr>
-            <a:r>
-              <a:rPr lang="de-CH" sz="2400" dirty="0" smtClean="0"/>
-              <a:t>	Behandlung solcher </a:t>
-            </a:r>
-            <a:r>
-              <a:rPr lang="de-CH" sz="2400" dirty="0" err="1" smtClean="0"/>
-              <a:t>Faults</a:t>
-            </a:r>
-            <a:r>
-              <a:rPr lang="de-CH" sz="2400" dirty="0" smtClean="0"/>
-              <a:t> schwierig.</a:t>
-            </a:r>
-            <a:endParaRPr lang="de-CH" sz="2400" dirty="0"/>
-          </a:p>
-        </p:txBody>
-      </p:sp>
-      <p:sp>
-        <p:nvSpPr>
-          <p:cNvPr id="4" name="Pfeil nach rechts 3"/>
-          <p:cNvSpPr/>
-          <p:nvPr/>
-        </p:nvSpPr>
-        <p:spPr>
-          <a:xfrm>
-            <a:off x="611560" y="3933056"/>
-            <a:ext cx="576064" cy="216024"/>
-          </a:xfrm>
-          <a:prstGeom prst="rightArrow">
-            <a:avLst/>
-          </a:prstGeom>
-        </p:spPr>
-        <p:style>
-          <a:lnRef idx="2">
-            <a:schemeClr val="accent1">
-              <a:shade val="50000"/>
-            </a:schemeClr>
-          </a:lnRef>
-          <a:fillRef idx="1">
-            <a:schemeClr val="accent1"/>
-          </a:fillRef>
-          <a:effectRef idx="0">
-            <a:schemeClr val="accent1"/>
-          </a:effectRef>
-          <a:fontRef idx="minor">
-            <a:schemeClr val="lt1"/>
-          </a:fontRef>
-        </p:style>
-        <p:txBody>
-          <a:bodyPr rtlCol="0" anchor="ctr"/>
-          <a:lstStyle/>
-          <a:p>
-            <a:pPr algn="ctr"/>
-            <a:endParaRPr lang="de-CH"/>
-          </a:p>
-        </p:txBody>
-      </p:sp>
-    </p:spTree>
-    <p:extLst>
-      <p:ext uri="{BB962C8B-B14F-4D97-AF65-F5344CB8AC3E}">
-        <p14:creationId xmlns="" xmlns:p14="http://schemas.microsoft.com/office/powerpoint/2010/main" val="447240795"/>
-      </p:ext>
-    </p:extLst>
-  </p:cSld>
-  <p:clrMapOvr>
-    <a:masterClrMapping/>
-  </p:clrMapOvr>
-  <p:timing>
-    <p:tnLst>
-      <p:par>
-        <p:cTn id="1" dur="indefinite" restart="never" nodeType="tmRoot"/>
-      </p:par>
-    </p:tnLst>
-  </p:timing>
-</p:sld>
-</file>
-
-<file path=ppt/slides/slide7.xml><?xml version="1.0" encoding="utf-8"?>
-<p:sld xmlns:a="http://schemas.openxmlformats.org/drawingml/2006/main" xmlns:r="http://schemas.openxmlformats.org/officeDocument/2006/relationships" xmlns:p="http://schemas.openxmlformats.org/presentationml/2006/main">
-  <p:cSld>
-    <p:spTree>
-      <p:nvGrpSpPr>
-        <p:cNvPr id="1" name=""/>
-        <p:cNvGrpSpPr/>
-        <p:nvPr/>
-      </p:nvGrpSpPr>
-      <p:grpSpPr>
-        <a:xfrm>
-          <a:off x="0" y="0"/>
-          <a:ext cx="0" cy="0"/>
-          <a:chOff x="0" y="0"/>
-          <a:chExt cx="0" cy="0"/>
-        </a:xfrm>
-      </p:grpSpPr>
-      <p:sp>
-        <p:nvSpPr>
-          <p:cNvPr id="2" name="Titel 1"/>
-          <p:cNvSpPr>
-            <a:spLocks noGrp="1"/>
-          </p:cNvSpPr>
-          <p:nvPr>
-            <p:ph type="title"/>
-          </p:nvPr>
-        </p:nvSpPr>
-        <p:spPr/>
-        <p:txBody>
-          <a:bodyPr/>
-          <a:lstStyle/>
-          <a:p>
-            <a:r>
-              <a:rPr lang="de-CH" dirty="0" smtClean="0"/>
-              <a:t>Hard Fault Handler</a:t>
-            </a:r>
-            <a:endParaRPr lang="de-CH" dirty="0"/>
-          </a:p>
-        </p:txBody>
-      </p:sp>
-      <p:sp>
-        <p:nvSpPr>
-          <p:cNvPr id="3" name="Inhaltsplatzhalter 2"/>
-          <p:cNvSpPr>
-            <a:spLocks noGrp="1"/>
-          </p:cNvSpPr>
-          <p:nvPr>
-            <p:ph idx="1"/>
-          </p:nvPr>
-        </p:nvSpPr>
-        <p:spPr/>
-        <p:txBody>
-          <a:bodyPr>
-            <a:normAutofit/>
-          </a:bodyPr>
-          <a:lstStyle/>
-          <a:p>
-            <a:r>
               <a:rPr lang="de-CH" sz="2400" dirty="0" err="1" smtClean="0"/>
               <a:t>HardFault</a:t>
             </a:r>
             <a:r>
               <a:rPr lang="de-CH" sz="2400" dirty="0" smtClean="0"/>
-              <a:t> implementiert speziellen </a:t>
+              <a:t> </a:t>
+            </a:r>
+            <a:r>
+              <a:rPr lang="de-CH" sz="2400" dirty="0" smtClean="0"/>
+              <a:t>PE Komponente implementiert </a:t>
+            </a:r>
+            <a:r>
+              <a:rPr lang="de-CH" sz="2400" dirty="0" smtClean="0"/>
+              <a:t>speziellen </a:t>
             </a:r>
             <a:r>
               <a:rPr lang="de-CH" sz="2400" dirty="0" err="1" smtClean="0"/>
@@ -4594,7 +4443,7 @@
           <a:blip r:embed="rId2" cstate="print">
             <a:extLst>
               <a:ext uri="{28A0092B-C50C-407E-A947-70E740481C1C}">
-                <a14:useLocalDpi xmlns="" xmlns:a14="http://schemas.microsoft.com/office/drawing/2010/main" val="0"/>
+                <a14:useLocalDpi xmlns:a14="http://schemas.microsoft.com/office/drawing/2010/main" val="0"/>
               </a:ext>
             </a:extLst>
           </a:blip>
@@ -4615,7 +4464,7 @@
     </p:spTree>
     <p:extLst>
       <p:ext uri="{BB962C8B-B14F-4D97-AF65-F5344CB8AC3E}">
-        <p14:creationId xmlns="" xmlns:p14="http://schemas.microsoft.com/office/powerpoint/2010/main" val="3311535714"/>
+        <p14:creationId xmlns:p14="http://schemas.microsoft.com/office/powerpoint/2010/main" val="3311535714"/>
       </p:ext>
     </p:extLst>
   </p:cSld>
@@ -4632,7 +4481,7 @@
 </p:sld>
 </file>
 
-<file path=ppt/slides/slide8.xml><?xml version="1.0" encoding="utf-8"?>
+<file path=ppt/slides/slide7.xml><?xml version="1.0" encoding="utf-8"?>
 <p:sld xmlns:a="http://schemas.openxmlformats.org/drawingml/2006/main" xmlns:r="http://schemas.openxmlformats.org/officeDocument/2006/relationships" xmlns:p="http://schemas.openxmlformats.org/presentationml/2006/main">
   <p:cSld>
     <p:spTree>
@@ -4735,7 +4584,7 @@
 </p:sld>
 </file>
 
-<file path=ppt/slides/slide9.xml><?xml version="1.0" encoding="utf-8"?>
+<file path=ppt/slides/slide8.xml><?xml version="1.0" encoding="utf-8"?>
 <p:sld xmlns:a="http://schemas.openxmlformats.org/drawingml/2006/main" xmlns:r="http://schemas.openxmlformats.org/officeDocument/2006/relationships" xmlns:p="http://schemas.openxmlformats.org/presentationml/2006/main">
   <p:cSld>
     <p:spTree>

</xml_diff>